<commit_message>
Updated Video Materials 20201116
</commit_message>
<xml_diff>
--- a/Task5-VideoPresentation/Fictious Airways.pptx
+++ b/Task5-VideoPresentation/Fictious Airways.pptx
@@ -15,8 +15,8 @@
     <p:sldId id="267" r:id="rId9"/>
     <p:sldId id="257" r:id="rId10"/>
     <p:sldId id="261" r:id="rId11"/>
-    <p:sldId id="270" r:id="rId12"/>
-    <p:sldId id="271" r:id="rId13"/>
+    <p:sldId id="271" r:id="rId12"/>
+    <p:sldId id="270" r:id="rId13"/>
     <p:sldId id="262" r:id="rId14"/>
     <p:sldId id="263" r:id="rId15"/>
     <p:sldId id="266" r:id="rId16"/>
@@ -276,7 +276,7 @@
           <a:p>
             <a:fld id="{C171B789-3FC1-4C3F-84EF-62A47431F9FB}" type="datetimeFigureOut">
               <a:rPr lang="en-US" smtClean="0"/>
-              <a:t>10/26/2020</a:t>
+              <a:t>11/1/2020</a:t>
             </a:fld>
             <a:endParaRPr lang="en-US"/>
           </a:p>
@@ -474,7 +474,7 @@
           <a:p>
             <a:fld id="{C171B789-3FC1-4C3F-84EF-62A47431F9FB}" type="datetimeFigureOut">
               <a:rPr lang="en-US" smtClean="0"/>
-              <a:t>10/26/2020</a:t>
+              <a:t>11/1/2020</a:t>
             </a:fld>
             <a:endParaRPr lang="en-US"/>
           </a:p>
@@ -682,7 +682,7 @@
           <a:p>
             <a:fld id="{C171B789-3FC1-4C3F-84EF-62A47431F9FB}" type="datetimeFigureOut">
               <a:rPr lang="en-US" smtClean="0"/>
-              <a:t>10/26/2020</a:t>
+              <a:t>11/1/2020</a:t>
             </a:fld>
             <a:endParaRPr lang="en-US"/>
           </a:p>
@@ -880,7 +880,7 @@
           <a:p>
             <a:fld id="{C171B789-3FC1-4C3F-84EF-62A47431F9FB}" type="datetimeFigureOut">
               <a:rPr lang="en-US" smtClean="0"/>
-              <a:t>10/26/2020</a:t>
+              <a:t>11/1/2020</a:t>
             </a:fld>
             <a:endParaRPr lang="en-US"/>
           </a:p>
@@ -1155,7 +1155,7 @@
           <a:p>
             <a:fld id="{C171B789-3FC1-4C3F-84EF-62A47431F9FB}" type="datetimeFigureOut">
               <a:rPr lang="en-US" smtClean="0"/>
-              <a:t>10/26/2020</a:t>
+              <a:t>11/1/2020</a:t>
             </a:fld>
             <a:endParaRPr lang="en-US"/>
           </a:p>
@@ -1420,7 +1420,7 @@
           <a:p>
             <a:fld id="{C171B789-3FC1-4C3F-84EF-62A47431F9FB}" type="datetimeFigureOut">
               <a:rPr lang="en-US" smtClean="0"/>
-              <a:t>10/26/2020</a:t>
+              <a:t>11/1/2020</a:t>
             </a:fld>
             <a:endParaRPr lang="en-US"/>
           </a:p>
@@ -1832,7 +1832,7 @@
           <a:p>
             <a:fld id="{C171B789-3FC1-4C3F-84EF-62A47431F9FB}" type="datetimeFigureOut">
               <a:rPr lang="en-US" smtClean="0"/>
-              <a:t>10/26/2020</a:t>
+              <a:t>11/1/2020</a:t>
             </a:fld>
             <a:endParaRPr lang="en-US"/>
           </a:p>
@@ -1973,7 +1973,7 @@
           <a:p>
             <a:fld id="{C171B789-3FC1-4C3F-84EF-62A47431F9FB}" type="datetimeFigureOut">
               <a:rPr lang="en-US" smtClean="0"/>
-              <a:t>10/26/2020</a:t>
+              <a:t>11/1/2020</a:t>
             </a:fld>
             <a:endParaRPr lang="en-US"/>
           </a:p>
@@ -2086,7 +2086,7 @@
           <a:p>
             <a:fld id="{C171B789-3FC1-4C3F-84EF-62A47431F9FB}" type="datetimeFigureOut">
               <a:rPr lang="en-US" smtClean="0"/>
-              <a:t>10/26/2020</a:t>
+              <a:t>11/1/2020</a:t>
             </a:fld>
             <a:endParaRPr lang="en-US"/>
           </a:p>
@@ -2397,7 +2397,7 @@
           <a:p>
             <a:fld id="{C171B789-3FC1-4C3F-84EF-62A47431F9FB}" type="datetimeFigureOut">
               <a:rPr lang="en-US" smtClean="0"/>
-              <a:t>10/26/2020</a:t>
+              <a:t>11/1/2020</a:t>
             </a:fld>
             <a:endParaRPr lang="en-US"/>
           </a:p>
@@ -2685,7 +2685,7 @@
           <a:p>
             <a:fld id="{C171B789-3FC1-4C3F-84EF-62A47431F9FB}" type="datetimeFigureOut">
               <a:rPr lang="en-US" smtClean="0"/>
-              <a:t>10/26/2020</a:t>
+              <a:t>11/1/2020</a:t>
             </a:fld>
             <a:endParaRPr lang="en-US"/>
           </a:p>
@@ -2926,7 +2926,7 @@
           <a:p>
             <a:fld id="{C171B789-3FC1-4C3F-84EF-62A47431F9FB}" type="datetimeFigureOut">
               <a:rPr lang="en-US" smtClean="0"/>
-              <a:t>10/26/2020</a:t>
+              <a:t>11/1/2020</a:t>
             </a:fld>
             <a:endParaRPr lang="en-US"/>
           </a:p>
@@ -3329,6 +3329,14 @@
 <file path=ppt/slides/slide1.xml><?xml version="1.0" encoding="utf-8"?>
 <p:sld xmlns:a="http://schemas.openxmlformats.org/drawingml/2006/main" xmlns:r="http://schemas.openxmlformats.org/officeDocument/2006/relationships" xmlns:p="http://schemas.openxmlformats.org/presentationml/2006/main">
   <p:cSld>
+    <p:bg>
+      <p:bgPr>
+        <a:solidFill>
+          <a:schemeClr val="bg1"/>
+        </a:solidFill>
+        <a:effectLst/>
+      </p:bgPr>
+    </p:bg>
     <p:spTree>
       <p:nvGrpSpPr>
         <p:cNvPr id="1" name=""/>
@@ -3343,39 +3351,6 @@
           <a:chExt cx="0" cy="0"/>
         </a:xfrm>
       </p:grpSpPr>
-      <p:sp>
-        <p:nvSpPr>
-          <p:cNvPr id="2" name="Title 1">
-            <a:extLst>
-              <a:ext uri="{FF2B5EF4-FFF2-40B4-BE49-F238E27FC236}">
-                <a16:creationId xmlns:a16="http://schemas.microsoft.com/office/drawing/2014/main" id="{D677F2B0-E799-4F23-ACF0-CC70FF7E09D2}"/>
-              </a:ext>
-            </a:extLst>
-          </p:cNvPr>
-          <p:cNvSpPr>
-            <a:spLocks noGrp="1"/>
-          </p:cNvSpPr>
-          <p:nvPr>
-            <p:ph type="ctrTitle"/>
-          </p:nvPr>
-        </p:nvSpPr>
-        <p:spPr>
-          <a:xfrm>
-            <a:off x="1501422" y="4061937"/>
-            <a:ext cx="8997244" cy="1695772"/>
-          </a:xfrm>
-        </p:spPr>
-        <p:txBody>
-          <a:bodyPr/>
-          <a:lstStyle/>
-          <a:p>
-            <a:r>
-              <a:rPr lang="en-US" dirty="0"/>
-              <a:t>Fictious Airways</a:t>
-            </a:r>
-          </a:p>
-        </p:txBody>
-      </p:sp>
       <p:pic>
         <p:nvPicPr>
           <p:cNvPr id="4" name="Picture 3" descr="Why Do 90-Second Flights Exist? A Look at the World's Shortest Flights |  Condé Nast Traveler">
@@ -3388,7 +3363,7 @@
           <p:cNvPicPr/>
           <p:nvPr/>
         </p:nvPicPr>
-        <p:blipFill>
+        <p:blipFill rotWithShape="1">
           <a:blip r:embed="rId2" cstate="print">
             <a:extLst>
               <a:ext uri="{28A0092B-C50C-407E-A947-70E740481C1C}">
@@ -3396,15 +3371,13 @@
               </a:ext>
             </a:extLst>
           </a:blip>
-          <a:srcRect/>
-          <a:stretch>
-            <a:fillRect/>
-          </a:stretch>
+          <a:srcRect t="10337" b="730"/>
+          <a:stretch/>
         </p:blipFill>
         <p:spPr bwMode="auto">
           <a:xfrm>
-            <a:off x="2625221" y="752321"/>
-            <a:ext cx="6586014" cy="4157502"/>
+            <a:off x="20" y="10"/>
+            <a:ext cx="12191980" cy="6857990"/>
           </a:xfrm>
           <a:prstGeom prst="rect">
             <a:avLst/>
@@ -3421,6 +3394,275 @@
           </a:extLst>
         </p:spPr>
       </p:pic>
+      <p:sp>
+        <p:nvSpPr>
+          <p:cNvPr id="9" name="Rectangle 8">
+            <a:extLst>
+              <a:ext uri="{FF2B5EF4-FFF2-40B4-BE49-F238E27FC236}">
+                <a16:creationId xmlns:a16="http://schemas.microsoft.com/office/drawing/2014/main" id="{37C89E4B-3C9F-44B9-8B86-D9E3D112D8EC}"/>
+              </a:ext>
+              <a:ext uri="{C183D7F6-B498-43B3-948B-1728B52AA6E4}">
+                <adec:decorative xmlns:adec="http://schemas.microsoft.com/office/drawing/2017/decorative" val="1"/>
+              </a:ext>
+            </a:extLst>
+          </p:cNvPr>
+          <p:cNvSpPr>
+            <a:spLocks noGrp="1" noRot="1" noChangeAspect="1" noMove="1" noResize="1" noEditPoints="1" noAdjustHandles="1" noChangeArrowheads="1" noChangeShapeType="1" noTextEdit="1"/>
+          </p:cNvSpPr>
+          <p:nvPr>
+            <p:extLst>
+              <p:ext uri="{386F3935-93C4-4BCD-93E2-E3B085C9AB24}">
+                <p16:designElem xmlns:p16="http://schemas.microsoft.com/office/powerpoint/2015/main" val="1"/>
+              </p:ext>
+            </p:extLst>
+          </p:nvPr>
+        </p:nvSpPr>
+        <p:spPr>
+          <a:xfrm>
+            <a:off x="0" y="5320142"/>
+            <a:ext cx="12192000" cy="736551"/>
+          </a:xfrm>
+          <a:prstGeom prst="rect">
+            <a:avLst/>
+          </a:prstGeom>
+          <a:solidFill>
+            <a:schemeClr val="bg1">
+              <a:alpha val="93000"/>
+            </a:schemeClr>
+          </a:solidFill>
+          <a:ln>
+            <a:noFill/>
+          </a:ln>
+        </p:spPr>
+        <p:style>
+          <a:lnRef idx="2">
+            <a:schemeClr val="accent1">
+              <a:shade val="50000"/>
+            </a:schemeClr>
+          </a:lnRef>
+          <a:fillRef idx="1">
+            <a:schemeClr val="accent1"/>
+          </a:fillRef>
+          <a:effectRef idx="0">
+            <a:schemeClr val="accent1"/>
+          </a:effectRef>
+          <a:fontRef idx="minor">
+            <a:schemeClr val="lt1"/>
+          </a:fontRef>
+        </p:style>
+        <p:txBody>
+          <a:bodyPr rtlCol="0" anchor="ctr"/>
+          <a:lstStyle/>
+          <a:p>
+            <a:pPr algn="ctr"/>
+            <a:endParaRPr lang="en-US"/>
+          </a:p>
+        </p:txBody>
+      </p:sp>
+      <p:sp>
+        <p:nvSpPr>
+          <p:cNvPr id="2" name="Title 1">
+            <a:extLst>
+              <a:ext uri="{FF2B5EF4-FFF2-40B4-BE49-F238E27FC236}">
+                <a16:creationId xmlns:a16="http://schemas.microsoft.com/office/drawing/2014/main" id="{D677F2B0-E799-4F23-ACF0-CC70FF7E09D2}"/>
+              </a:ext>
+            </a:extLst>
+          </p:cNvPr>
+          <p:cNvSpPr>
+            <a:spLocks noGrp="1"/>
+          </p:cNvSpPr>
+          <p:nvPr>
+            <p:ph type="ctrTitle"/>
+          </p:nvPr>
+        </p:nvSpPr>
+        <p:spPr>
+          <a:xfrm>
+            <a:off x="523875" y="5317240"/>
+            <a:ext cx="11210925" cy="744836"/>
+          </a:xfrm>
+        </p:spPr>
+        <p:txBody>
+          <a:bodyPr vert="horz" lIns="91440" tIns="45720" rIns="91440" bIns="45720" rtlCol="0" anchor="ctr">
+            <a:normAutofit/>
+          </a:bodyPr>
+          <a:lstStyle/>
+          <a:p>
+            <a:r>
+              <a:rPr lang="en-US" sz="3600">
+                <a:solidFill>
+                  <a:schemeClr val="tx1">
+                    <a:lumMod val="85000"/>
+                    <a:lumOff val="15000"/>
+                  </a:schemeClr>
+                </a:solidFill>
+              </a:rPr>
+              <a:t>Fictious Airways</a:t>
+            </a:r>
+          </a:p>
+        </p:txBody>
+      </p:sp>
+      <p:cxnSp>
+        <p:nvCxnSpPr>
+          <p:cNvPr id="11" name="Straight Connector 10">
+            <a:extLst>
+              <a:ext uri="{FF2B5EF4-FFF2-40B4-BE49-F238E27FC236}">
+                <a16:creationId xmlns:a16="http://schemas.microsoft.com/office/drawing/2014/main" id="{AA2EAA10-076F-46BD-8F0F-B9A2FB77A85C}"/>
+              </a:ext>
+              <a:ext uri="{C183D7F6-B498-43B3-948B-1728B52AA6E4}">
+                <adec:decorative xmlns:adec="http://schemas.microsoft.com/office/drawing/2017/decorative" val="1"/>
+              </a:ext>
+            </a:extLst>
+          </p:cNvPr>
+          <p:cNvCxnSpPr>
+            <a:cxnSpLocks noGrp="1" noRot="1" noChangeAspect="1" noMove="1" noResize="1" noEditPoints="1" noAdjustHandles="1" noChangeArrowheads="1" noChangeShapeType="1"/>
+          </p:cNvCxnSpPr>
+          <p:nvPr>
+            <p:extLst>
+              <p:ext uri="{386F3935-93C4-4BCD-93E2-E3B085C9AB24}">
+                <p16:designElem xmlns:p16="http://schemas.microsoft.com/office/powerpoint/2015/main" val="1"/>
+              </p:ext>
+            </p:extLst>
+          </p:nvPr>
+        </p:nvCxnSpPr>
+        <p:spPr>
+          <a:xfrm>
+            <a:off x="0" y="5241983"/>
+            <a:ext cx="12192000" cy="0"/>
+          </a:xfrm>
+          <a:prstGeom prst="line">
+            <a:avLst/>
+          </a:prstGeom>
+          <a:ln w="41275">
+            <a:solidFill>
+              <a:schemeClr val="bg1">
+                <a:alpha val="90000"/>
+              </a:schemeClr>
+            </a:solidFill>
+          </a:ln>
+        </p:spPr>
+        <p:style>
+          <a:lnRef idx="1">
+            <a:schemeClr val="accent1"/>
+          </a:lnRef>
+          <a:fillRef idx="0">
+            <a:schemeClr val="accent1"/>
+          </a:fillRef>
+          <a:effectRef idx="0">
+            <a:schemeClr val="accent1"/>
+          </a:effectRef>
+          <a:fontRef idx="minor">
+            <a:schemeClr val="tx1"/>
+          </a:fontRef>
+        </p:style>
+      </p:cxnSp>
+      <p:cxnSp>
+        <p:nvCxnSpPr>
+          <p:cNvPr id="13" name="Straight Connector 12">
+            <a:extLst>
+              <a:ext uri="{FF2B5EF4-FFF2-40B4-BE49-F238E27FC236}">
+                <a16:creationId xmlns:a16="http://schemas.microsoft.com/office/drawing/2014/main" id="{D891E407-403B-4764-86C9-33A56D3BCAA3}"/>
+              </a:ext>
+              <a:ext uri="{C183D7F6-B498-43B3-948B-1728B52AA6E4}">
+                <adec:decorative xmlns:adec="http://schemas.microsoft.com/office/drawing/2017/decorative" val="1"/>
+              </a:ext>
+            </a:extLst>
+          </p:cNvPr>
+          <p:cNvCxnSpPr>
+            <a:cxnSpLocks noGrp="1" noRot="1" noChangeAspect="1" noMove="1" noResize="1" noEditPoints="1" noAdjustHandles="1" noChangeArrowheads="1" noChangeShapeType="1"/>
+          </p:cNvCxnSpPr>
+          <p:nvPr>
+            <p:extLst>
+              <p:ext uri="{386F3935-93C4-4BCD-93E2-E3B085C9AB24}">
+                <p16:designElem xmlns:p16="http://schemas.microsoft.com/office/powerpoint/2015/main" val="1"/>
+              </p:ext>
+            </p:extLst>
+          </p:nvPr>
+        </p:nvCxnSpPr>
+        <p:spPr>
+          <a:xfrm>
+            <a:off x="0" y="6134852"/>
+            <a:ext cx="12192000" cy="0"/>
+          </a:xfrm>
+          <a:prstGeom prst="line">
+            <a:avLst/>
+          </a:prstGeom>
+          <a:ln w="41275">
+            <a:solidFill>
+              <a:schemeClr val="bg1">
+                <a:alpha val="90000"/>
+              </a:schemeClr>
+            </a:solidFill>
+          </a:ln>
+        </p:spPr>
+        <p:style>
+          <a:lnRef idx="1">
+            <a:schemeClr val="accent1"/>
+          </a:lnRef>
+          <a:fillRef idx="0">
+            <a:schemeClr val="accent1"/>
+          </a:fillRef>
+          <a:effectRef idx="0">
+            <a:schemeClr val="accent1"/>
+          </a:effectRef>
+          <a:fontRef idx="minor">
+            <a:schemeClr val="tx1"/>
+          </a:fontRef>
+        </p:style>
+      </p:cxnSp>
+      <p:sp>
+        <p:nvSpPr>
+          <p:cNvPr id="7" name="Title 1">
+            <a:extLst>
+              <a:ext uri="{FF2B5EF4-FFF2-40B4-BE49-F238E27FC236}">
+                <a16:creationId xmlns:a16="http://schemas.microsoft.com/office/drawing/2014/main" id="{8F7D6DEF-6DAE-456F-A05C-4DF4FE25AD24}"/>
+              </a:ext>
+            </a:extLst>
+          </p:cNvPr>
+          <p:cNvSpPr txBox="1">
+            <a:spLocks/>
+          </p:cNvSpPr>
+          <p:nvPr/>
+        </p:nvSpPr>
+        <p:spPr>
+          <a:xfrm>
+            <a:off x="1152525" y="5472069"/>
+            <a:ext cx="10515600" cy="1325563"/>
+          </a:xfrm>
+          <a:prstGeom prst="rect">
+            <a:avLst/>
+          </a:prstGeom>
+        </p:spPr>
+        <p:txBody>
+          <a:bodyPr vert="horz" lIns="91440" tIns="45720" rIns="91440" bIns="45720" rtlCol="0" anchor="b">
+            <a:normAutofit/>
+          </a:bodyPr>
+          <a:lstStyle>
+            <a:lvl1pPr algn="ctr" defTabSz="914400" rtl="0" eaLnBrk="1" latinLnBrk="0" hangingPunct="1">
+              <a:lnSpc>
+                <a:spcPct val="90000"/>
+              </a:lnSpc>
+              <a:spcBef>
+                <a:spcPct val="0"/>
+              </a:spcBef>
+              <a:buNone/>
+              <a:defRPr sz="6000" kern="1200">
+                <a:solidFill>
+                  <a:schemeClr val="tx1"/>
+                </a:solidFill>
+                <a:latin typeface="+mj-lt"/>
+                <a:ea typeface="+mj-ea"/>
+                <a:cs typeface="+mj-cs"/>
+              </a:defRPr>
+            </a:lvl1pPr>
+          </a:lstStyle>
+          <a:p>
+            <a:r>
+              <a:rPr lang="en-US" sz="3600" dirty="0"/>
+              <a:t>How we improved flight safety.</a:t>
+            </a:r>
+          </a:p>
+        </p:txBody>
+      </p:sp>
     </p:spTree>
     <p:extLst>
       <p:ext uri="{BB962C8B-B14F-4D97-AF65-F5344CB8AC3E}">
@@ -3451,34 +3693,6 @@
           <a:chExt cx="0" cy="0"/>
         </a:xfrm>
       </p:grpSpPr>
-      <p:sp>
-        <p:nvSpPr>
-          <p:cNvPr id="2" name="Title 1">
-            <a:extLst>
-              <a:ext uri="{FF2B5EF4-FFF2-40B4-BE49-F238E27FC236}">
-                <a16:creationId xmlns:a16="http://schemas.microsoft.com/office/drawing/2014/main" id="{D6CC958F-FCBC-4F64-9049-8DD9A82653D1}"/>
-              </a:ext>
-            </a:extLst>
-          </p:cNvPr>
-          <p:cNvSpPr>
-            <a:spLocks noGrp="1"/>
-          </p:cNvSpPr>
-          <p:nvPr>
-            <p:ph type="title"/>
-          </p:nvPr>
-        </p:nvSpPr>
-        <p:spPr/>
-        <p:txBody>
-          <a:bodyPr/>
-          <a:lstStyle/>
-          <a:p>
-            <a:r>
-              <a:rPr lang="en-US" dirty="0"/>
-              <a:t>What do our recorded crash metrics tell us about our aircraft?</a:t>
-            </a:r>
-          </a:p>
-        </p:txBody>
-      </p:sp>
       <p:pic>
         <p:nvPicPr>
           <p:cNvPr id="7" name="Picture 6">
@@ -3501,14 +3715,42 @@
         </p:blipFill>
         <p:spPr>
           <a:xfrm>
-            <a:off x="3454235" y="1690688"/>
-            <a:ext cx="6638179" cy="4982815"/>
+            <a:off x="2743200" y="1321506"/>
+            <a:ext cx="7172751" cy="5384081"/>
           </a:xfrm>
           <a:prstGeom prst="rect">
             <a:avLst/>
           </a:prstGeom>
         </p:spPr>
       </p:pic>
+      <p:sp>
+        <p:nvSpPr>
+          <p:cNvPr id="2" name="Title 1">
+            <a:extLst>
+              <a:ext uri="{FF2B5EF4-FFF2-40B4-BE49-F238E27FC236}">
+                <a16:creationId xmlns:a16="http://schemas.microsoft.com/office/drawing/2014/main" id="{D6CC958F-FCBC-4F64-9049-8DD9A82653D1}"/>
+              </a:ext>
+            </a:extLst>
+          </p:cNvPr>
+          <p:cNvSpPr>
+            <a:spLocks noGrp="1"/>
+          </p:cNvSpPr>
+          <p:nvPr>
+            <p:ph type="title"/>
+          </p:nvPr>
+        </p:nvSpPr>
+        <p:spPr/>
+        <p:txBody>
+          <a:bodyPr/>
+          <a:lstStyle/>
+          <a:p>
+            <a:r>
+              <a:rPr lang="en-US" dirty="0"/>
+              <a:t>What do our recorded crash metrics tell us about our aircraft?</a:t>
+            </a:r>
+          </a:p>
+        </p:txBody>
+      </p:sp>
     </p:spTree>
     <p:extLst>
       <p:ext uri="{BB962C8B-B14F-4D97-AF65-F5344CB8AC3E}">
@@ -3544,100 +3786,6 @@
           <p:cNvPr id="2" name="Title 1">
             <a:extLst>
               <a:ext uri="{FF2B5EF4-FFF2-40B4-BE49-F238E27FC236}">
-                <a16:creationId xmlns:a16="http://schemas.microsoft.com/office/drawing/2014/main" id="{47F44A8B-3729-4D9A-9260-475461ADEC2A}"/>
-              </a:ext>
-            </a:extLst>
-          </p:cNvPr>
-          <p:cNvSpPr>
-            <a:spLocks noGrp="1"/>
-          </p:cNvSpPr>
-          <p:nvPr>
-            <p:ph type="title"/>
-          </p:nvPr>
-        </p:nvSpPr>
-        <p:spPr>
-          <a:xfrm>
-            <a:off x="838200" y="233032"/>
-            <a:ext cx="10515600" cy="1325563"/>
-          </a:xfrm>
-        </p:spPr>
-        <p:txBody>
-          <a:bodyPr>
-            <a:normAutofit/>
-          </a:bodyPr>
-          <a:lstStyle/>
-          <a:p>
-            <a:r>
-              <a:rPr lang="en-US" sz="3200" dirty="0"/>
-              <a:t>How does our survival counts stack up against fatality counts.</a:t>
-            </a:r>
-          </a:p>
-        </p:txBody>
-      </p:sp>
-      <p:pic>
-        <p:nvPicPr>
-          <p:cNvPr id="5" name="Picture 4">
-            <a:extLst>
-              <a:ext uri="{FF2B5EF4-FFF2-40B4-BE49-F238E27FC236}">
-                <a16:creationId xmlns:a16="http://schemas.microsoft.com/office/drawing/2014/main" id="{23CC5758-46F9-49E2-921E-BE1B722AD12A}"/>
-              </a:ext>
-            </a:extLst>
-          </p:cNvPr>
-          <p:cNvPicPr>
-            <a:picLocks noChangeAspect="1"/>
-          </p:cNvPicPr>
-          <p:nvPr/>
-        </p:nvPicPr>
-        <p:blipFill rotWithShape="1">
-          <a:blip r:embed="rId2"/>
-          <a:srcRect t="566" r="3" b="3"/>
-          <a:stretch/>
-        </p:blipFill>
-        <p:spPr>
-          <a:xfrm>
-            <a:off x="1492957" y="1223936"/>
-            <a:ext cx="9028287" cy="5520954"/>
-          </a:xfrm>
-          <a:prstGeom prst="rect">
-            <a:avLst/>
-          </a:prstGeom>
-        </p:spPr>
-      </p:pic>
-    </p:spTree>
-    <p:extLst>
-      <p:ext uri="{BB962C8B-B14F-4D97-AF65-F5344CB8AC3E}">
-        <p14:creationId xmlns:p14="http://schemas.microsoft.com/office/powerpoint/2010/main" val="2149321540"/>
-      </p:ext>
-    </p:extLst>
-  </p:cSld>
-  <p:clrMapOvr>
-    <a:masterClrMapping/>
-  </p:clrMapOvr>
-</p:sld>
-</file>
-
-<file path=ppt/slides/slide12.xml><?xml version="1.0" encoding="utf-8"?>
-<p:sld xmlns:a="http://schemas.openxmlformats.org/drawingml/2006/main" xmlns:r="http://schemas.openxmlformats.org/officeDocument/2006/relationships" xmlns:p="http://schemas.openxmlformats.org/presentationml/2006/main">
-  <p:cSld>
-    <p:spTree>
-      <p:nvGrpSpPr>
-        <p:cNvPr id="1" name=""/>
-        <p:cNvGrpSpPr/>
-        <p:nvPr/>
-      </p:nvGrpSpPr>
-      <p:grpSpPr>
-        <a:xfrm>
-          <a:off x="0" y="0"/>
-          <a:ext cx="0" cy="0"/>
-          <a:chOff x="0" y="0"/>
-          <a:chExt cx="0" cy="0"/>
-        </a:xfrm>
-      </p:grpSpPr>
-      <p:sp>
-        <p:nvSpPr>
-          <p:cNvPr id="2" name="Title 1">
-            <a:extLst>
-              <a:ext uri="{FF2B5EF4-FFF2-40B4-BE49-F238E27FC236}">
                 <a16:creationId xmlns:a16="http://schemas.microsoft.com/office/drawing/2014/main" id="{6E62949C-3CF2-4338-B0CA-B84CB6612A63}"/>
               </a:ext>
             </a:extLst>
@@ -3694,7 +3842,7 @@
         </p:blipFill>
         <p:spPr bwMode="auto">
           <a:xfrm>
-            <a:off x="1614311" y="1457191"/>
+            <a:off x="1614311" y="1252907"/>
             <a:ext cx="8568767" cy="5239968"/>
           </a:xfrm>
           <a:prstGeom prst="rect">
@@ -3725,6 +3873,100 @@
 </p:sld>
 </file>
 
+<file path=ppt/slides/slide12.xml><?xml version="1.0" encoding="utf-8"?>
+<p:sld xmlns:a="http://schemas.openxmlformats.org/drawingml/2006/main" xmlns:r="http://schemas.openxmlformats.org/officeDocument/2006/relationships" xmlns:p="http://schemas.openxmlformats.org/presentationml/2006/main">
+  <p:cSld>
+    <p:spTree>
+      <p:nvGrpSpPr>
+        <p:cNvPr id="1" name=""/>
+        <p:cNvGrpSpPr/>
+        <p:nvPr/>
+      </p:nvGrpSpPr>
+      <p:grpSpPr>
+        <a:xfrm>
+          <a:off x="0" y="0"/>
+          <a:ext cx="0" cy="0"/>
+          <a:chOff x="0" y="0"/>
+          <a:chExt cx="0" cy="0"/>
+        </a:xfrm>
+      </p:grpSpPr>
+      <p:pic>
+        <p:nvPicPr>
+          <p:cNvPr id="5" name="Picture 4">
+            <a:extLst>
+              <a:ext uri="{FF2B5EF4-FFF2-40B4-BE49-F238E27FC236}">
+                <a16:creationId xmlns:a16="http://schemas.microsoft.com/office/drawing/2014/main" id="{23CC5758-46F9-49E2-921E-BE1B722AD12A}"/>
+              </a:ext>
+            </a:extLst>
+          </p:cNvPr>
+          <p:cNvPicPr>
+            <a:picLocks noChangeAspect="1"/>
+          </p:cNvPicPr>
+          <p:nvPr/>
+        </p:nvPicPr>
+        <p:blipFill rotWithShape="1">
+          <a:blip r:embed="rId2"/>
+          <a:srcRect t="566" r="3" b="3"/>
+          <a:stretch/>
+        </p:blipFill>
+        <p:spPr>
+          <a:xfrm>
+            <a:off x="1420915" y="1140209"/>
+            <a:ext cx="9350170" cy="5717791"/>
+          </a:xfrm>
+          <a:prstGeom prst="rect">
+            <a:avLst/>
+          </a:prstGeom>
+        </p:spPr>
+      </p:pic>
+      <p:sp>
+        <p:nvSpPr>
+          <p:cNvPr id="2" name="Title 1">
+            <a:extLst>
+              <a:ext uri="{FF2B5EF4-FFF2-40B4-BE49-F238E27FC236}">
+                <a16:creationId xmlns:a16="http://schemas.microsoft.com/office/drawing/2014/main" id="{47F44A8B-3729-4D9A-9260-475461ADEC2A}"/>
+              </a:ext>
+            </a:extLst>
+          </p:cNvPr>
+          <p:cNvSpPr>
+            <a:spLocks noGrp="1"/>
+          </p:cNvSpPr>
+          <p:nvPr>
+            <p:ph type="title"/>
+          </p:nvPr>
+        </p:nvSpPr>
+        <p:spPr>
+          <a:xfrm>
+            <a:off x="838200" y="233032"/>
+            <a:ext cx="10515600" cy="1325563"/>
+          </a:xfrm>
+        </p:spPr>
+        <p:txBody>
+          <a:bodyPr>
+            <a:normAutofit/>
+          </a:bodyPr>
+          <a:lstStyle/>
+          <a:p>
+            <a:r>
+              <a:rPr lang="en-US" sz="3200" dirty="0"/>
+              <a:t>How does our survival counts stack up against fatality counts?</a:t>
+            </a:r>
+          </a:p>
+        </p:txBody>
+      </p:sp>
+    </p:spTree>
+    <p:extLst>
+      <p:ext uri="{BB962C8B-B14F-4D97-AF65-F5344CB8AC3E}">
+        <p14:creationId xmlns:p14="http://schemas.microsoft.com/office/powerpoint/2010/main" val="2149321540"/>
+      </p:ext>
+    </p:extLst>
+  </p:cSld>
+  <p:clrMapOvr>
+    <a:masterClrMapping/>
+  </p:clrMapOvr>
+</p:sld>
+</file>
+
 <file path=ppt/slides/slide13.xml><?xml version="1.0" encoding="utf-8"?>
 <p:sld xmlns:a="http://schemas.openxmlformats.org/drawingml/2006/main" xmlns:r="http://schemas.openxmlformats.org/officeDocument/2006/relationships" xmlns:p="http://schemas.openxmlformats.org/presentationml/2006/main">
   <p:cSld>
@@ -3765,7 +4007,7 @@
           <a:p>
             <a:r>
               <a:rPr lang="en-US" dirty="0"/>
-              <a:t>Revealing the survival rate metric for each aircraft.</a:t>
+              <a:t>Revealing the new survival rate metric for each aircraft.</a:t>
             </a:r>
           </a:p>
         </p:txBody>
@@ -3792,7 +4034,7 @@
         </p:blipFill>
         <p:spPr>
           <a:xfrm>
-            <a:off x="681319" y="2032867"/>
+            <a:off x="601108" y="1952656"/>
             <a:ext cx="11295029" cy="4139334"/>
           </a:xfrm>
           <a:prstGeom prst="rect">
@@ -3852,7 +4094,7 @@
         </p:blipFill>
         <p:spPr>
           <a:xfrm>
-            <a:off x="869448" y="1347455"/>
+            <a:off x="1061953" y="1347455"/>
             <a:ext cx="10484352" cy="5510545"/>
           </a:xfrm>
           <a:prstGeom prst="rect">
@@ -3890,7 +4132,7 @@
           <a:p>
             <a:r>
               <a:rPr lang="en-US" sz="2800" dirty="0"/>
-              <a:t>How does the survival rate for each aircraft contribute to Fictious Airways’ overall survival rate?</a:t>
+              <a:t>How does this new survival rate metric contribute to Fictious Airways’ overall survival rate?</a:t>
             </a:r>
           </a:p>
         </p:txBody>
@@ -3950,7 +4192,7 @@
           <a:p>
             <a:r>
               <a:rPr lang="en-US" sz="3200" dirty="0"/>
-              <a:t>Which aircraft should be targeted to be removed to improve overall survival rate?</a:t>
+              <a:t>How we improved our survival rate? Which aircraft should be targeted to be removed to improve overall survival rate?</a:t>
             </a:r>
           </a:p>
         </p:txBody>
@@ -4129,7 +4371,7 @@
           <a:p>
             <a:r>
               <a:rPr lang="en-US" sz="3200" dirty="0"/>
-              <a:t>One more review of the aircraft identified for </a:t>
+              <a:t>How did we further assess the aircraft identified for </a:t>
             </a:r>
             <a:r>
               <a:rPr lang="en-US" sz="3200" dirty="0" err="1"/>
@@ -4294,7 +4536,7 @@
         </p:blipFill>
         <p:spPr bwMode="auto">
           <a:xfrm>
-            <a:off x="5988247" y="195262"/>
+            <a:off x="5921012" y="477650"/>
             <a:ext cx="4854575" cy="3064510"/>
           </a:xfrm>
           <a:prstGeom prst="rect">
@@ -4452,6 +4694,270 @@
 <file path=ppt/slides/slide2.xml><?xml version="1.0" encoding="utf-8"?>
 <p:sld xmlns:a="http://schemas.openxmlformats.org/drawingml/2006/main" xmlns:r="http://schemas.openxmlformats.org/officeDocument/2006/relationships" xmlns:p="http://schemas.openxmlformats.org/presentationml/2006/main">
   <p:cSld>
+    <p:bg>
+      <p:bgPr>
+        <a:solidFill>
+          <a:schemeClr val="bg1"/>
+        </a:solidFill>
+        <a:effectLst/>
+      </p:bgPr>
+    </p:bg>
+    <p:spTree>
+      <p:nvGrpSpPr>
+        <p:cNvPr id="1" name=""/>
+        <p:cNvGrpSpPr/>
+        <p:nvPr/>
+      </p:nvGrpSpPr>
+      <p:grpSpPr>
+        <a:xfrm>
+          <a:off x="0" y="0"/>
+          <a:ext cx="0" cy="0"/>
+          <a:chOff x="0" y="0"/>
+          <a:chExt cx="0" cy="0"/>
+        </a:xfrm>
+      </p:grpSpPr>
+      <p:sp>
+        <p:nvSpPr>
+          <p:cNvPr id="137" name="Rectangle 136">
+            <a:extLst>
+              <a:ext uri="{FF2B5EF4-FFF2-40B4-BE49-F238E27FC236}">
+                <a16:creationId xmlns:a16="http://schemas.microsoft.com/office/drawing/2014/main" id="{1707FC24-6981-43D9-B525-C7832BA22463}"/>
+              </a:ext>
+              <a:ext uri="{C183D7F6-B498-43B3-948B-1728B52AA6E4}">
+                <adec:decorative xmlns:adec="http://schemas.microsoft.com/office/drawing/2017/decorative" val="1"/>
+              </a:ext>
+            </a:extLst>
+          </p:cNvPr>
+          <p:cNvSpPr>
+            <a:spLocks noGrp="1" noRot="1" noChangeAspect="1" noMove="1" noResize="1" noEditPoints="1" noAdjustHandles="1" noChangeArrowheads="1" noChangeShapeType="1" noTextEdit="1"/>
+          </p:cNvSpPr>
+          <p:nvPr>
+            <p:extLst>
+              <p:ext uri="{386F3935-93C4-4BCD-93E2-E3B085C9AB24}">
+                <p16:designElem xmlns:p16="http://schemas.microsoft.com/office/powerpoint/2015/main" val="1"/>
+              </p:ext>
+            </p:extLst>
+          </p:nvPr>
+        </p:nvSpPr>
+        <p:spPr bwMode="ltGray">
+          <a:xfrm>
+            <a:off x="336884" y="311449"/>
+            <a:ext cx="4332307" cy="6179552"/>
+          </a:xfrm>
+          <a:prstGeom prst="rect">
+            <a:avLst/>
+          </a:prstGeom>
+          <a:solidFill>
+            <a:srgbClr val="404040"/>
+          </a:solidFill>
+          <a:ln w="127000" cap="sq" cmpd="thinThick">
+            <a:solidFill>
+              <a:srgbClr val="404040"/>
+            </a:solidFill>
+          </a:ln>
+        </p:spPr>
+        <p:style>
+          <a:lnRef idx="2">
+            <a:schemeClr val="accent1">
+              <a:shade val="50000"/>
+            </a:schemeClr>
+          </a:lnRef>
+          <a:fillRef idx="1">
+            <a:schemeClr val="accent1"/>
+          </a:fillRef>
+          <a:effectRef idx="0">
+            <a:schemeClr val="accent1"/>
+          </a:effectRef>
+          <a:fontRef idx="minor">
+            <a:schemeClr val="lt1"/>
+          </a:fontRef>
+        </p:style>
+        <p:txBody>
+          <a:bodyPr rtlCol="0" anchor="ctr"/>
+          <a:lstStyle/>
+          <a:p>
+            <a:pPr algn="ctr"/>
+            <a:endParaRPr lang="en-US"/>
+          </a:p>
+        </p:txBody>
+      </p:sp>
+      <p:pic>
+        <p:nvPicPr>
+          <p:cNvPr id="6146" name="Picture 2">
+            <a:extLst>
+              <a:ext uri="{FF2B5EF4-FFF2-40B4-BE49-F238E27FC236}">
+                <a16:creationId xmlns:a16="http://schemas.microsoft.com/office/drawing/2014/main" id="{4B73700F-DE69-4CE3-B6BD-4075783B2274}"/>
+              </a:ext>
+            </a:extLst>
+          </p:cNvPr>
+          <p:cNvPicPr>
+            <a:picLocks noChangeAspect="1" noChangeArrowheads="1"/>
+          </p:cNvPicPr>
+          <p:nvPr/>
+        </p:nvPicPr>
+        <p:blipFill rotWithShape="1">
+          <a:blip r:embed="rId2">
+            <a:alphaModFix/>
+            <a:extLst>
+              <a:ext uri="{28A0092B-C50C-407E-A947-70E740481C1C}">
+                <a14:useLocalDpi xmlns:a14="http://schemas.microsoft.com/office/drawing/2010/main" val="0"/>
+              </a:ext>
+            </a:extLst>
+          </a:blip>
+          <a:srcRect l="1890" r="-2" b="-2"/>
+          <a:stretch/>
+        </p:blipFill>
+        <p:spPr bwMode="auto">
+          <a:xfrm>
+            <a:off x="5143500" y="482600"/>
+            <a:ext cx="6553200" cy="3111500"/>
+          </a:xfrm>
+          <a:prstGeom prst="rect">
+            <a:avLst/>
+          </a:prstGeom>
+          <a:extLst>
+            <a:ext uri="{909E8E84-426E-40DD-AFC4-6F175D3DCCD1}">
+              <a14:hiddenFill xmlns:a14="http://schemas.microsoft.com/office/drawing/2010/main">
+                <a:solidFill>
+                  <a:srgbClr val="FFFFFF"/>
+                </a:solidFill>
+              </a14:hiddenFill>
+            </a:ext>
+          </a:extLst>
+        </p:spPr>
+      </p:pic>
+      <p:pic>
+        <p:nvPicPr>
+          <p:cNvPr id="6148" name="Picture 4">
+            <a:extLst>
+              <a:ext uri="{FF2B5EF4-FFF2-40B4-BE49-F238E27FC236}">
+                <a16:creationId xmlns:a16="http://schemas.microsoft.com/office/drawing/2014/main" id="{3C9BAD6A-EBEF-4300-A5CC-A7409F038349}"/>
+              </a:ext>
+            </a:extLst>
+          </p:cNvPr>
+          <p:cNvPicPr>
+            <a:picLocks noChangeAspect="1" noChangeArrowheads="1"/>
+          </p:cNvPicPr>
+          <p:nvPr/>
+        </p:nvPicPr>
+        <p:blipFill rotWithShape="1">
+          <a:blip r:embed="rId3">
+            <a:extLst>
+              <a:ext uri="{28A0092B-C50C-407E-A947-70E740481C1C}">
+                <a14:useLocalDpi xmlns:a14="http://schemas.microsoft.com/office/drawing/2010/main" val="0"/>
+              </a:ext>
+            </a:extLst>
+          </a:blip>
+          <a:srcRect t="22685" r="-1" b="15058"/>
+          <a:stretch/>
+        </p:blipFill>
+        <p:spPr bwMode="auto">
+          <a:xfrm>
+            <a:off x="5143500" y="3670300"/>
+            <a:ext cx="6553200" cy="2679700"/>
+          </a:xfrm>
+          <a:prstGeom prst="rect">
+            <a:avLst/>
+          </a:prstGeom>
+          <a:extLst>
+            <a:ext uri="{909E8E84-426E-40DD-AFC4-6F175D3DCCD1}">
+              <a14:hiddenFill xmlns:a14="http://schemas.microsoft.com/office/drawing/2010/main">
+                <a:solidFill>
+                  <a:srgbClr val="FFFFFF"/>
+                </a:solidFill>
+              </a14:hiddenFill>
+            </a:ext>
+          </a:extLst>
+        </p:spPr>
+      </p:pic>
+      <p:sp>
+        <p:nvSpPr>
+          <p:cNvPr id="2" name="Title 1">
+            <a:extLst>
+              <a:ext uri="{FF2B5EF4-FFF2-40B4-BE49-F238E27FC236}">
+                <a16:creationId xmlns:a16="http://schemas.microsoft.com/office/drawing/2014/main" id="{6DD0A5C9-7997-4A3B-A2C8-9CB00AFC2E76}"/>
+              </a:ext>
+            </a:extLst>
+          </p:cNvPr>
+          <p:cNvSpPr>
+            <a:spLocks noGrp="1"/>
+          </p:cNvSpPr>
+          <p:nvPr>
+            <p:ph type="title"/>
+          </p:nvPr>
+        </p:nvSpPr>
+        <p:spPr>
+          <a:xfrm>
+            <a:off x="742950" y="742951"/>
+            <a:ext cx="3476625" cy="4962524"/>
+          </a:xfrm>
+        </p:spPr>
+        <p:txBody>
+          <a:bodyPr vert="horz" lIns="91440" tIns="45720" rIns="91440" bIns="45720" rtlCol="0" anchor="ctr">
+            <a:normAutofit/>
+          </a:bodyPr>
+          <a:lstStyle/>
+          <a:p>
+            <a:pPr algn="ctr"/>
+            <a:r>
+              <a:rPr lang="en-US" sz="4800" kern="1200">
+                <a:solidFill>
+                  <a:srgbClr val="FFFFFF"/>
+                </a:solidFill>
+                <a:latin typeface="+mj-lt"/>
+                <a:ea typeface="+mj-ea"/>
+                <a:cs typeface="+mj-cs"/>
+              </a:rPr>
+              <a:t>Who are we? </a:t>
+            </a:r>
+            <a:br>
+              <a:rPr lang="en-US" sz="4800" kern="1200">
+                <a:solidFill>
+                  <a:srgbClr val="FFFFFF"/>
+                </a:solidFill>
+                <a:latin typeface="+mj-lt"/>
+                <a:ea typeface="+mj-ea"/>
+                <a:cs typeface="+mj-cs"/>
+              </a:rPr>
+            </a:br>
+            <a:r>
+              <a:rPr lang="en-US" sz="4800" kern="1200">
+                <a:solidFill>
+                  <a:srgbClr val="FFFFFF"/>
+                </a:solidFill>
+                <a:latin typeface="+mj-lt"/>
+                <a:ea typeface="+mj-ea"/>
+                <a:cs typeface="+mj-cs"/>
+              </a:rPr>
+              <a:t>  And where have we been?</a:t>
+            </a:r>
+          </a:p>
+        </p:txBody>
+      </p:sp>
+    </p:spTree>
+    <p:extLst>
+      <p:ext uri="{BB962C8B-B14F-4D97-AF65-F5344CB8AC3E}">
+        <p14:creationId xmlns:p14="http://schemas.microsoft.com/office/powerpoint/2010/main" val="999799223"/>
+      </p:ext>
+    </p:extLst>
+  </p:cSld>
+  <p:clrMapOvr>
+    <a:masterClrMapping/>
+  </p:clrMapOvr>
+</p:sld>
+</file>
+
+<file path=ppt/slides/slide3.xml><?xml version="1.0" encoding="utf-8"?>
+<p:sld xmlns:a="http://schemas.openxmlformats.org/drawingml/2006/main" xmlns:r="http://schemas.openxmlformats.org/officeDocument/2006/relationships" xmlns:p="http://schemas.openxmlformats.org/presentationml/2006/main">
+  <p:cSld>
+    <p:bg>
+      <p:bgPr>
+        <a:solidFill>
+          <a:schemeClr val="bg1"/>
+        </a:solidFill>
+        <a:effectLst/>
+      </p:bgPr>
+    </p:bg>
     <p:spTree>
       <p:nvGrpSpPr>
         <p:cNvPr id="1" name=""/>
@@ -4468,10 +4974,10 @@
       </p:grpSpPr>
       <p:pic>
         <p:nvPicPr>
-          <p:cNvPr id="6148" name="Picture 4">
-            <a:extLst>
-              <a:ext uri="{FF2B5EF4-FFF2-40B4-BE49-F238E27FC236}">
-                <a16:creationId xmlns:a16="http://schemas.microsoft.com/office/drawing/2014/main" id="{3C9BAD6A-EBEF-4300-A5CC-A7409F038349}"/>
+          <p:cNvPr id="8194" name="Picture 2">
+            <a:extLst>
+              <a:ext uri="{FF2B5EF4-FFF2-40B4-BE49-F238E27FC236}">
+                <a16:creationId xmlns:a16="http://schemas.microsoft.com/office/drawing/2014/main" id="{11F1A066-4712-426F-8913-5B9A82A032E7}"/>
               </a:ext>
             </a:extLst>
           </p:cNvPr>
@@ -4480,23 +4986,22 @@
           </p:cNvPicPr>
           <p:nvPr/>
         </p:nvPicPr>
-        <p:blipFill>
+        <p:blipFill rotWithShape="1">
           <a:blip r:embed="rId2">
+            <a:alphaModFix amt="35000"/>
             <a:extLst>
               <a:ext uri="{28A0092B-C50C-407E-A947-70E740481C1C}">
                 <a14:useLocalDpi xmlns:a14="http://schemas.microsoft.com/office/drawing/2010/main" val="0"/>
               </a:ext>
             </a:extLst>
           </a:blip>
-          <a:srcRect/>
-          <a:stretch>
-            <a:fillRect/>
-          </a:stretch>
+          <a:srcRect t="25022"/>
+          <a:stretch/>
         </p:blipFill>
         <p:spPr bwMode="auto">
           <a:xfrm>
-            <a:off x="7371229" y="365125"/>
-            <a:ext cx="4305300" cy="2876550"/>
+            <a:off x="-1" y="-7"/>
+            <a:ext cx="12192000" cy="6855958"/>
           </a:xfrm>
           <a:prstGeom prst="rect">
             <a:avLst/>
@@ -4518,7 +5023,7 @@
           <p:cNvPr id="2" name="Title 1">
             <a:extLst>
               <a:ext uri="{FF2B5EF4-FFF2-40B4-BE49-F238E27FC236}">
-                <a16:creationId xmlns:a16="http://schemas.microsoft.com/office/drawing/2014/main" id="{6DD0A5C9-7997-4A3B-A2C8-9CB00AFC2E76}"/>
+                <a16:creationId xmlns:a16="http://schemas.microsoft.com/office/drawing/2014/main" id="{EE6DEFF9-5288-46B6-8654-308B1A0CC305}"/>
               </a:ext>
             </a:extLst>
           </p:cNvPr>
@@ -4529,33 +5034,241 @@
             <p:ph type="title"/>
           </p:nvPr>
         </p:nvSpPr>
-        <p:spPr/>
-        <p:txBody>
-          <a:bodyPr>
+        <p:spPr>
+          <a:xfrm>
+            <a:off x="5759784" y="5137015"/>
+            <a:ext cx="5747520" cy="1922251"/>
+          </a:xfrm>
+        </p:spPr>
+        <p:txBody>
+          <a:bodyPr vert="horz" lIns="91440" tIns="45720" rIns="91440" bIns="45720" rtlCol="0" anchor="t">
             <a:normAutofit/>
           </a:bodyPr>
           <a:lstStyle/>
           <a:p>
             <a:r>
-              <a:rPr lang="en-US" dirty="0"/>
-              <a:t>Who are we? </a:t>
-            </a:r>
-            <a:br>
-              <a:rPr lang="en-US" dirty="0"/>
-            </a:br>
-            <a:r>
-              <a:rPr lang="en-US" dirty="0"/>
-              <a:t>  And where have we been?</a:t>
-            </a:r>
+              <a:rPr lang="en-US" sz="2800" kern="1200" dirty="0">
+                <a:solidFill>
+                  <a:schemeClr val="tx1"/>
+                </a:solidFill>
+                <a:latin typeface="+mj-lt"/>
+                <a:ea typeface="+mj-ea"/>
+                <a:cs typeface="+mj-cs"/>
+              </a:rPr>
+              <a:t>As news of crash fatalities become more publicized our company dreams become nightmares.</a:t>
+            </a:r>
+          </a:p>
+        </p:txBody>
+      </p:sp>
+      <p:sp>
+        <p:nvSpPr>
+          <p:cNvPr id="135" name="Freeform: Shape 134">
+            <a:extLst>
+              <a:ext uri="{FF2B5EF4-FFF2-40B4-BE49-F238E27FC236}">
+                <a16:creationId xmlns:a16="http://schemas.microsoft.com/office/drawing/2014/main" id="{B26D9126-4D1A-435C-92FD-2EFD34104B27}"/>
+              </a:ext>
+              <a:ext uri="{C183D7F6-B498-43B3-948B-1728B52AA6E4}">
+                <adec:decorative xmlns:adec="http://schemas.microsoft.com/office/drawing/2017/decorative" val="1"/>
+              </a:ext>
+            </a:extLst>
+          </p:cNvPr>
+          <p:cNvSpPr>
+            <a:spLocks noGrp="1" noRot="1" noChangeAspect="1" noMove="1" noResize="1" noEditPoints="1" noAdjustHandles="1" noChangeArrowheads="1" noChangeShapeType="1" noTextEdit="1"/>
+          </p:cNvSpPr>
+          <p:nvPr>
+            <p:extLst>
+              <p:ext uri="{386F3935-93C4-4BCD-93E2-E3B085C9AB24}">
+                <p16:designElem xmlns:p16="http://schemas.microsoft.com/office/powerpoint/2015/main" val="1"/>
+              </p:ext>
+            </p:extLst>
+          </p:nvPr>
+        </p:nvSpPr>
+        <p:spPr>
+          <a:xfrm>
+            <a:off x="-1" y="483466"/>
+            <a:ext cx="5444264" cy="6374535"/>
+          </a:xfrm>
+          <a:custGeom>
+            <a:avLst/>
+            <a:gdLst>
+              <a:gd name="connsiteX0" fmla="*/ 2098246 w 5444264"/>
+              <a:gd name="connsiteY0" fmla="*/ 0 h 6374535"/>
+              <a:gd name="connsiteX1" fmla="*/ 5444264 w 5444264"/>
+              <a:gd name="connsiteY1" fmla="*/ 3346018 h 6374535"/>
+              <a:gd name="connsiteX2" fmla="*/ 3693157 w 5444264"/>
+              <a:gd name="connsiteY2" fmla="*/ 6288190 h 6374535"/>
+              <a:gd name="connsiteX3" fmla="*/ 3513916 w 5444264"/>
+              <a:gd name="connsiteY3" fmla="*/ 6374535 h 6374535"/>
+              <a:gd name="connsiteX4" fmla="*/ 674773 w 5444264"/>
+              <a:gd name="connsiteY4" fmla="*/ 6374535 h 6374535"/>
+              <a:gd name="connsiteX5" fmla="*/ 432743 w 5444264"/>
+              <a:gd name="connsiteY5" fmla="*/ 6248727 h 6374535"/>
+              <a:gd name="connsiteX6" fmla="*/ 194223 w 5444264"/>
+              <a:gd name="connsiteY6" fmla="*/ 6097845 h 6374535"/>
+              <a:gd name="connsiteX7" fmla="*/ 0 w 5444264"/>
+              <a:gd name="connsiteY7" fmla="*/ 5950784 h 6374535"/>
+              <a:gd name="connsiteX8" fmla="*/ 0 w 5444264"/>
+              <a:gd name="connsiteY8" fmla="*/ 741253 h 6374535"/>
+              <a:gd name="connsiteX9" fmla="*/ 194222 w 5444264"/>
+              <a:gd name="connsiteY9" fmla="*/ 594191 h 6374535"/>
+              <a:gd name="connsiteX10" fmla="*/ 2098246 w 5444264"/>
+              <a:gd name="connsiteY10" fmla="*/ 0 h 6374535"/>
+            </a:gdLst>
+            <a:ahLst/>
+            <a:cxnLst>
+              <a:cxn ang="0">
+                <a:pos x="connsiteX0" y="connsiteY0"/>
+              </a:cxn>
+              <a:cxn ang="0">
+                <a:pos x="connsiteX1" y="connsiteY1"/>
+              </a:cxn>
+              <a:cxn ang="0">
+                <a:pos x="connsiteX2" y="connsiteY2"/>
+              </a:cxn>
+              <a:cxn ang="0">
+                <a:pos x="connsiteX3" y="connsiteY3"/>
+              </a:cxn>
+              <a:cxn ang="0">
+                <a:pos x="connsiteX4" y="connsiteY4"/>
+              </a:cxn>
+              <a:cxn ang="0">
+                <a:pos x="connsiteX5" y="connsiteY5"/>
+              </a:cxn>
+              <a:cxn ang="0">
+                <a:pos x="connsiteX6" y="connsiteY6"/>
+              </a:cxn>
+              <a:cxn ang="0">
+                <a:pos x="connsiteX7" y="connsiteY7"/>
+              </a:cxn>
+              <a:cxn ang="0">
+                <a:pos x="connsiteX8" y="connsiteY8"/>
+              </a:cxn>
+              <a:cxn ang="0">
+                <a:pos x="connsiteX9" y="connsiteY9"/>
+              </a:cxn>
+              <a:cxn ang="0">
+                <a:pos x="connsiteX10" y="connsiteY10"/>
+              </a:cxn>
+            </a:cxnLst>
+            <a:rect l="l" t="t" r="r" b="b"/>
+            <a:pathLst>
+              <a:path w="5444264" h="6374535">
+                <a:moveTo>
+                  <a:pt x="2098246" y="0"/>
+                </a:moveTo>
+                <a:cubicBezTo>
+                  <a:pt x="3946201" y="0"/>
+                  <a:pt x="5444264" y="1498063"/>
+                  <a:pt x="5444264" y="3346018"/>
+                </a:cubicBezTo>
+                <a:cubicBezTo>
+                  <a:pt x="5444264" y="4616487"/>
+                  <a:pt x="4736195" y="5721578"/>
+                  <a:pt x="3693157" y="6288190"/>
+                </a:cubicBezTo>
+                <a:lnTo>
+                  <a:pt x="3513916" y="6374535"/>
+                </a:lnTo>
+                <a:lnTo>
+                  <a:pt x="674773" y="6374535"/>
+                </a:lnTo>
+                <a:lnTo>
+                  <a:pt x="432743" y="6248727"/>
+                </a:lnTo>
+                <a:cubicBezTo>
+                  <a:pt x="351001" y="6201724"/>
+                  <a:pt x="271431" y="6151368"/>
+                  <a:pt x="194223" y="6097845"/>
+                </a:cubicBezTo>
+                <a:lnTo>
+                  <a:pt x="0" y="5950784"/>
+                </a:lnTo>
+                <a:lnTo>
+                  <a:pt x="0" y="741253"/>
+                </a:lnTo>
+                <a:lnTo>
+                  <a:pt x="194222" y="594191"/>
+                </a:lnTo>
+                <a:cubicBezTo>
+                  <a:pt x="734681" y="219535"/>
+                  <a:pt x="1390826" y="0"/>
+                  <a:pt x="2098246" y="0"/>
+                </a:cubicBezTo>
+                <a:close/>
+              </a:path>
+            </a:pathLst>
+          </a:custGeom>
+          <a:solidFill>
+            <a:srgbClr val="FFFFFF">
+              <a:alpha val="80000"/>
+            </a:srgbClr>
+          </a:solidFill>
+          <a:ln>
+            <a:noFill/>
+          </a:ln>
+        </p:spPr>
+        <p:style>
+          <a:lnRef idx="2">
+            <a:schemeClr val="accent1">
+              <a:shade val="50000"/>
+            </a:schemeClr>
+          </a:lnRef>
+          <a:fillRef idx="1">
+            <a:schemeClr val="accent1"/>
+          </a:fillRef>
+          <a:effectRef idx="0">
+            <a:schemeClr val="accent1"/>
+          </a:effectRef>
+          <a:fontRef idx="minor">
+            <a:schemeClr val="lt1"/>
+          </a:fontRef>
+        </p:style>
+        <p:txBody>
+          <a:bodyPr wrap="square" rtlCol="0" anchor="ctr">
+            <a:noAutofit/>
+          </a:bodyPr>
+          <a:lstStyle/>
+          <a:p>
+            <a:pPr marL="0" marR="0" lvl="0" indent="0" algn="ctr" defTabSz="914400" rtl="0" eaLnBrk="1" fontAlgn="auto" latinLnBrk="0" hangingPunct="1">
+              <a:lnSpc>
+                <a:spcPct val="100000"/>
+              </a:lnSpc>
+              <a:spcBef>
+                <a:spcPts val="0"/>
+              </a:spcBef>
+              <a:spcAft>
+                <a:spcPts val="0"/>
+              </a:spcAft>
+              <a:buClrTx/>
+              <a:buSzTx/>
+              <a:buFontTx/>
+              <a:buNone/>
+              <a:tabLst/>
+              <a:defRPr/>
+            </a:pPr>
+            <a:endParaRPr kumimoji="0" lang="en-US" sz="1800" b="0" i="0" u="none" strike="noStrike" kern="1200" cap="none" spc="0" normalizeH="0" baseline="0" noProof="0">
+              <a:ln>
+                <a:noFill/>
+              </a:ln>
+              <a:solidFill>
+                <a:prstClr val="white"/>
+              </a:solidFill>
+              <a:effectLst/>
+              <a:uLnTx/>
+              <a:uFillTx/>
+              <a:latin typeface="Calibri" panose="020F0502020204030204"/>
+              <a:ea typeface="+mn-ea"/>
+              <a:cs typeface="+mn-cs"/>
+            </a:endParaRPr>
           </a:p>
         </p:txBody>
       </p:sp>
       <p:pic>
         <p:nvPicPr>
-          <p:cNvPr id="6146" name="Picture 2">
-            <a:extLst>
-              <a:ext uri="{FF2B5EF4-FFF2-40B4-BE49-F238E27FC236}">
-                <a16:creationId xmlns:a16="http://schemas.microsoft.com/office/drawing/2014/main" id="{4B73700F-DE69-4CE3-B6BD-4075783B2274}"/>
+          <p:cNvPr id="1026" name="Picture 2" descr="2 Die and Many Are Hurt as Plane Crashes in San Francisco - The New York  Times">
+            <a:extLst>
+              <a:ext uri="{FF2B5EF4-FFF2-40B4-BE49-F238E27FC236}">
+                <a16:creationId xmlns:a16="http://schemas.microsoft.com/office/drawing/2014/main" id="{9B0E76F4-15F0-4033-ADFF-4348CC0755E2}"/>
               </a:ext>
             </a:extLst>
           </p:cNvPr>
@@ -4564,7 +5277,7 @@
           </p:cNvPicPr>
           <p:nvPr/>
         </p:nvPicPr>
-        <p:blipFill>
+        <p:blipFill rotWithShape="1">
           <a:blip r:embed="rId3">
             <a:extLst>
               <a:ext uri="{28A0092B-C50C-407E-A947-70E740481C1C}">
@@ -4572,19 +5285,67 @@
               </a:ext>
             </a:extLst>
           </a:blip>
-          <a:srcRect/>
-          <a:stretch>
-            <a:fillRect/>
-          </a:stretch>
+          <a:srcRect l="16292" r="27808" b="2"/>
+          <a:stretch/>
         </p:blipFill>
         <p:spPr bwMode="auto">
           <a:xfrm>
-            <a:off x="515471" y="2213215"/>
-            <a:ext cx="8835274" cy="4176048"/>
+            <a:off x="20" y="647373"/>
+            <a:ext cx="5280336" cy="6210629"/>
           </a:xfrm>
-          <a:prstGeom prst="rect">
+          <a:custGeom>
             <a:avLst/>
-          </a:prstGeom>
+            <a:gdLst/>
+            <a:ahLst/>
+            <a:cxnLst/>
+            <a:rect l="l" t="t" r="r" b="b"/>
+            <a:pathLst>
+              <a:path w="5280356" h="6210629">
+                <a:moveTo>
+                  <a:pt x="2098244" y="0"/>
+                </a:moveTo>
+                <a:cubicBezTo>
+                  <a:pt x="3855676" y="0"/>
+                  <a:pt x="5280356" y="1424680"/>
+                  <a:pt x="5280356" y="3182112"/>
+                </a:cubicBezTo>
+                <a:cubicBezTo>
+                  <a:pt x="5280356" y="4500186"/>
+                  <a:pt x="4478974" y="5631087"/>
+                  <a:pt x="3336866" y="6114158"/>
+                </a:cubicBezTo>
+                <a:lnTo>
+                  <a:pt x="3073287" y="6210629"/>
+                </a:lnTo>
+                <a:lnTo>
+                  <a:pt x="1128432" y="6210629"/>
+                </a:lnTo>
+                <a:lnTo>
+                  <a:pt x="1004127" y="6171135"/>
+                </a:lnTo>
+                <a:cubicBezTo>
+                  <a:pt x="662964" y="6046219"/>
+                  <a:pt x="349154" y="5864559"/>
+                  <a:pt x="74125" y="5637585"/>
+                </a:cubicBezTo>
+                <a:lnTo>
+                  <a:pt x="0" y="5570216"/>
+                </a:lnTo>
+                <a:lnTo>
+                  <a:pt x="0" y="794009"/>
+                </a:lnTo>
+                <a:lnTo>
+                  <a:pt x="74125" y="726640"/>
+                </a:lnTo>
+                <a:cubicBezTo>
+                  <a:pt x="624182" y="272693"/>
+                  <a:pt x="1329368" y="0"/>
+                  <a:pt x="2098244" y="0"/>
+                </a:cubicBezTo>
+                <a:close/>
+              </a:path>
+            </a:pathLst>
+          </a:custGeom>
           <a:noFill/>
           <a:extLst>
             <a:ext uri="{909E8E84-426E-40DD-AFC4-6F175D3DCCD1}">
@@ -4597,100 +5358,181 @@
           </a:extLst>
         </p:spPr>
       </p:pic>
-    </p:spTree>
-    <p:extLst>
-      <p:ext uri="{BB962C8B-B14F-4D97-AF65-F5344CB8AC3E}">
-        <p14:creationId xmlns:p14="http://schemas.microsoft.com/office/powerpoint/2010/main" val="999799223"/>
-      </p:ext>
-    </p:extLst>
-  </p:cSld>
-  <p:clrMapOvr>
-    <a:masterClrMapping/>
-  </p:clrMapOvr>
-</p:sld>
-</file>
-
-<file path=ppt/slides/slide3.xml><?xml version="1.0" encoding="utf-8"?>
-<p:sld xmlns:a="http://schemas.openxmlformats.org/drawingml/2006/main" xmlns:r="http://schemas.openxmlformats.org/officeDocument/2006/relationships" xmlns:p="http://schemas.openxmlformats.org/presentationml/2006/main">
-  <p:cSld>
-    <p:spTree>
-      <p:nvGrpSpPr>
-        <p:cNvPr id="1" name=""/>
-        <p:cNvGrpSpPr/>
-        <p:nvPr/>
-      </p:nvGrpSpPr>
-      <p:grpSpPr>
-        <a:xfrm>
-          <a:off x="0" y="0"/>
-          <a:ext cx="0" cy="0"/>
-          <a:chOff x="0" y="0"/>
-          <a:chExt cx="0" cy="0"/>
-        </a:xfrm>
-      </p:grpSpPr>
-      <p:sp>
-        <p:nvSpPr>
-          <p:cNvPr id="2" name="Title 1">
-            <a:extLst>
-              <a:ext uri="{FF2B5EF4-FFF2-40B4-BE49-F238E27FC236}">
-                <a16:creationId xmlns:a16="http://schemas.microsoft.com/office/drawing/2014/main" id="{EE6DEFF9-5288-46B6-8654-308B1A0CC305}"/>
-              </a:ext>
-            </a:extLst>
-          </p:cNvPr>
-          <p:cNvSpPr>
-            <a:spLocks noGrp="1"/>
-          </p:cNvSpPr>
-          <p:nvPr>
-            <p:ph type="title"/>
-          </p:nvPr>
-        </p:nvSpPr>
-        <p:spPr/>
-        <p:txBody>
-          <a:bodyPr/>
-          <a:lstStyle/>
-          <a:p>
-            <a:r>
-              <a:rPr lang="en-US" dirty="0"/>
-              <a:t>As dreams become nightmares.</a:t>
-            </a:r>
-          </a:p>
-        </p:txBody>
-      </p:sp>
-      <p:sp>
-        <p:nvSpPr>
-          <p:cNvPr id="3" name="Content Placeholder 2">
-            <a:extLst>
-              <a:ext uri="{FF2B5EF4-FFF2-40B4-BE49-F238E27FC236}">
-                <a16:creationId xmlns:a16="http://schemas.microsoft.com/office/drawing/2014/main" id="{D46204F7-4EBC-4B55-9397-ABDE2304EB50}"/>
-              </a:ext>
-            </a:extLst>
-          </p:cNvPr>
-          <p:cNvSpPr>
-            <a:spLocks noGrp="1"/>
-          </p:cNvSpPr>
-          <p:nvPr>
-            <p:ph idx="1"/>
+      <p:sp>
+        <p:nvSpPr>
+          <p:cNvPr id="137" name="Freeform: Shape 136">
+            <a:extLst>
+              <a:ext uri="{FF2B5EF4-FFF2-40B4-BE49-F238E27FC236}">
+                <a16:creationId xmlns:a16="http://schemas.microsoft.com/office/drawing/2014/main" id="{8A177BCC-4208-4795-8572-4D623BA1E2A0}"/>
+              </a:ext>
+              <a:ext uri="{C183D7F6-B498-43B3-948B-1728B52AA6E4}">
+                <adec:decorative xmlns:adec="http://schemas.microsoft.com/office/drawing/2017/decorative" val="1"/>
+              </a:ext>
+            </a:extLst>
+          </p:cNvPr>
+          <p:cNvSpPr>
+            <a:spLocks noGrp="1" noRot="1" noChangeAspect="1" noMove="1" noResize="1" noEditPoints="1" noAdjustHandles="1" noChangeArrowheads="1" noChangeShapeType="1" noTextEdit="1"/>
+          </p:cNvSpPr>
+          <p:nvPr>
+            <p:extLst>
+              <p:ext uri="{386F3935-93C4-4BCD-93E2-E3B085C9AB24}">
+                <p16:designElem xmlns:p16="http://schemas.microsoft.com/office/powerpoint/2015/main" val="1"/>
+              </p:ext>
+            </p:extLst>
           </p:nvPr>
         </p:nvSpPr>
         <p:spPr>
           <a:xfrm>
-            <a:off x="6735858" y="1825625"/>
-            <a:ext cx="4617942" cy="4351338"/>
+            <a:off x="5341832" y="1"/>
+            <a:ext cx="4480560" cy="2513993"/>
           </a:xfrm>
+          <a:custGeom>
+            <a:avLst/>
+            <a:gdLst>
+              <a:gd name="connsiteX0" fmla="*/ 18382 w 4480560"/>
+              <a:gd name="connsiteY0" fmla="*/ 0 h 2513993"/>
+              <a:gd name="connsiteX1" fmla="*/ 4462178 w 4480560"/>
+              <a:gd name="connsiteY1" fmla="*/ 0 h 2513993"/>
+              <a:gd name="connsiteX2" fmla="*/ 4468994 w 4480560"/>
+              <a:gd name="connsiteY2" fmla="*/ 44657 h 2513993"/>
+              <a:gd name="connsiteX3" fmla="*/ 4480560 w 4480560"/>
+              <a:gd name="connsiteY3" fmla="*/ 273713 h 2513993"/>
+              <a:gd name="connsiteX4" fmla="*/ 2240280 w 4480560"/>
+              <a:gd name="connsiteY4" fmla="*/ 2513993 h 2513993"/>
+              <a:gd name="connsiteX5" fmla="*/ 0 w 4480560"/>
+              <a:gd name="connsiteY5" fmla="*/ 273713 h 2513993"/>
+              <a:gd name="connsiteX6" fmla="*/ 11567 w 4480560"/>
+              <a:gd name="connsiteY6" fmla="*/ 44657 h 2513993"/>
+            </a:gdLst>
+            <a:ahLst/>
+            <a:cxnLst>
+              <a:cxn ang="0">
+                <a:pos x="connsiteX0" y="connsiteY0"/>
+              </a:cxn>
+              <a:cxn ang="0">
+                <a:pos x="connsiteX1" y="connsiteY1"/>
+              </a:cxn>
+              <a:cxn ang="0">
+                <a:pos x="connsiteX2" y="connsiteY2"/>
+              </a:cxn>
+              <a:cxn ang="0">
+                <a:pos x="connsiteX3" y="connsiteY3"/>
+              </a:cxn>
+              <a:cxn ang="0">
+                <a:pos x="connsiteX4" y="connsiteY4"/>
+              </a:cxn>
+              <a:cxn ang="0">
+                <a:pos x="connsiteX5" y="connsiteY5"/>
+              </a:cxn>
+              <a:cxn ang="0">
+                <a:pos x="connsiteX6" y="connsiteY6"/>
+              </a:cxn>
+            </a:cxnLst>
+            <a:rect l="l" t="t" r="r" b="b"/>
+            <a:pathLst>
+              <a:path w="4480560" h="2513993">
+                <a:moveTo>
+                  <a:pt x="18382" y="0"/>
+                </a:moveTo>
+                <a:lnTo>
+                  <a:pt x="4462178" y="0"/>
+                </a:lnTo>
+                <a:lnTo>
+                  <a:pt x="4468994" y="44657"/>
+                </a:lnTo>
+                <a:cubicBezTo>
+                  <a:pt x="4476642" y="119969"/>
+                  <a:pt x="4480560" y="196384"/>
+                  <a:pt x="4480560" y="273713"/>
+                </a:cubicBezTo>
+                <a:cubicBezTo>
+                  <a:pt x="4480560" y="1510985"/>
+                  <a:pt x="3477552" y="2513993"/>
+                  <a:pt x="2240280" y="2513993"/>
+                </a:cubicBezTo>
+                <a:cubicBezTo>
+                  <a:pt x="1003008" y="2513993"/>
+                  <a:pt x="0" y="1510985"/>
+                  <a:pt x="0" y="273713"/>
+                </a:cubicBezTo>
+                <a:cubicBezTo>
+                  <a:pt x="0" y="196384"/>
+                  <a:pt x="3918" y="119969"/>
+                  <a:pt x="11567" y="44657"/>
+                </a:cubicBezTo>
+                <a:close/>
+              </a:path>
+            </a:pathLst>
+          </a:custGeom>
+          <a:solidFill>
+            <a:srgbClr val="FFFFFF">
+              <a:alpha val="80000"/>
+            </a:srgbClr>
+          </a:solidFill>
+          <a:ln>
+            <a:noFill/>
+          </a:ln>
         </p:spPr>
-        <p:txBody>
-          <a:bodyPr/>
-          <a:lstStyle/>
-          <a:p>
-            <a:endParaRPr lang="en-US" dirty="0"/>
+        <p:style>
+          <a:lnRef idx="2">
+            <a:schemeClr val="accent1">
+              <a:shade val="50000"/>
+            </a:schemeClr>
+          </a:lnRef>
+          <a:fillRef idx="1">
+            <a:schemeClr val="accent1"/>
+          </a:fillRef>
+          <a:effectRef idx="0">
+            <a:schemeClr val="accent1"/>
+          </a:effectRef>
+          <a:fontRef idx="minor">
+            <a:schemeClr val="lt1"/>
+          </a:fontRef>
+        </p:style>
+        <p:txBody>
+          <a:bodyPr rtlCol="0" anchor="ctr"/>
+          <a:lstStyle/>
+          <a:p>
+            <a:pPr marL="0" marR="0" lvl="0" indent="0" algn="ctr" defTabSz="914400" rtl="0" eaLnBrk="1" fontAlgn="auto" latinLnBrk="0" hangingPunct="1">
+              <a:lnSpc>
+                <a:spcPct val="100000"/>
+              </a:lnSpc>
+              <a:spcBef>
+                <a:spcPts val="0"/>
+              </a:spcBef>
+              <a:spcAft>
+                <a:spcPts val="0"/>
+              </a:spcAft>
+              <a:buClrTx/>
+              <a:buSzTx/>
+              <a:buFontTx/>
+              <a:buNone/>
+              <a:tabLst/>
+              <a:defRPr/>
+            </a:pPr>
+            <a:endParaRPr kumimoji="0" lang="en-US" sz="1800" b="0" i="0" u="none" strike="noStrike" kern="1200" cap="none" spc="0" normalizeH="0" baseline="0" noProof="0">
+              <a:ln>
+                <a:noFill/>
+              </a:ln>
+              <a:solidFill>
+                <a:prstClr val="white"/>
+              </a:solidFill>
+              <a:effectLst/>
+              <a:uLnTx/>
+              <a:uFillTx/>
+              <a:latin typeface="Calibri" panose="020F0502020204030204"/>
+              <a:ea typeface="+mn-ea"/>
+              <a:cs typeface="+mn-cs"/>
+            </a:endParaRPr>
           </a:p>
         </p:txBody>
       </p:sp>
       <p:pic>
         <p:nvPicPr>
-          <p:cNvPr id="8194" name="Picture 2">
-            <a:extLst>
-              <a:ext uri="{FF2B5EF4-FFF2-40B4-BE49-F238E27FC236}">
-                <a16:creationId xmlns:a16="http://schemas.microsoft.com/office/drawing/2014/main" id="{11F1A066-4712-426F-8913-5B9A82A032E7}"/>
+          <p:cNvPr id="1028" name="Picture 4" descr="3 dead, over 170 injured after passenger plane crashes at Istanbul airport  - ABC News">
+            <a:extLst>
+              <a:ext uri="{FF2B5EF4-FFF2-40B4-BE49-F238E27FC236}">
+                <a16:creationId xmlns:a16="http://schemas.microsoft.com/office/drawing/2014/main" id="{502FE239-38C4-4681-8CD3-0BED5432361A}"/>
               </a:ext>
             </a:extLst>
           </p:cNvPr>
@@ -4699,27 +5541,63 @@
           </p:cNvPicPr>
           <p:nvPr/>
         </p:nvPicPr>
-        <p:blipFill>
-          <a:blip r:embed="rId2">
+        <p:blipFill rotWithShape="1">
+          <a:blip r:embed="rId4">
             <a:extLst>
               <a:ext uri="{28A0092B-C50C-407E-A947-70E740481C1C}">
                 <a14:useLocalDpi xmlns:a14="http://schemas.microsoft.com/office/drawing/2010/main" val="0"/>
               </a:ext>
             </a:extLst>
           </a:blip>
-          <a:srcRect/>
-          <a:stretch>
-            <a:fillRect/>
-          </a:stretch>
+          <a:srcRect r="609" b="2"/>
+          <a:stretch/>
         </p:blipFill>
         <p:spPr bwMode="auto">
           <a:xfrm>
-            <a:off x="838199" y="1871662"/>
-            <a:ext cx="5740401" cy="4305301"/>
+            <a:off x="5506424" y="8"/>
+            <a:ext cx="4151376" cy="2349401"/>
           </a:xfrm>
-          <a:prstGeom prst="rect">
+          <a:custGeom>
             <a:avLst/>
-          </a:prstGeom>
+            <a:gdLst/>
+            <a:ahLst/>
+            <a:cxnLst/>
+            <a:rect l="l" t="t" r="r" b="b"/>
+            <a:pathLst>
+              <a:path w="4151376" h="2349401">
+                <a:moveTo>
+                  <a:pt x="20101" y="0"/>
+                </a:moveTo>
+                <a:lnTo>
+                  <a:pt x="4131276" y="0"/>
+                </a:lnTo>
+                <a:lnTo>
+                  <a:pt x="4140659" y="61486"/>
+                </a:lnTo>
+                <a:cubicBezTo>
+                  <a:pt x="4147746" y="131265"/>
+                  <a:pt x="4151376" y="202065"/>
+                  <a:pt x="4151376" y="273713"/>
+                </a:cubicBezTo>
+                <a:cubicBezTo>
+                  <a:pt x="4151376" y="1420084"/>
+                  <a:pt x="3222059" y="2349401"/>
+                  <a:pt x="2075688" y="2349401"/>
+                </a:cubicBezTo>
+                <a:cubicBezTo>
+                  <a:pt x="929317" y="2349401"/>
+                  <a:pt x="0" y="1420084"/>
+                  <a:pt x="0" y="273713"/>
+                </a:cubicBezTo>
+                <a:cubicBezTo>
+                  <a:pt x="0" y="202065"/>
+                  <a:pt x="3630" y="131265"/>
+                  <a:pt x="10717" y="61486"/>
+                </a:cubicBezTo>
+                <a:close/>
+              </a:path>
+            </a:pathLst>
+          </a:custGeom>
           <a:noFill/>
           <a:extLst>
             <a:ext uri="{909E8E84-426E-40DD-AFC4-6F175D3DCCD1}">
@@ -4740,7 +5618,7 @@
     </p:extLst>
   </p:cSld>
   <p:clrMapOvr>
-    <a:masterClrMapping/>
+    <a:overrideClrMapping bg1="dk1" tx1="lt1" bg2="dk2" tx2="lt2" accent1="accent1" accent2="accent2" accent3="accent3" accent4="accent4" accent5="accent5" accent6="accent6" hlink="hlink" folHlink="folHlink"/>
   </p:clrMapOvr>
 </p:sld>
 </file>
@@ -4785,7 +5663,7 @@
           <a:p>
             <a:r>
               <a:rPr lang="en-US" dirty="0"/>
-              <a:t>Safety concerns impact air travel.</a:t>
+              <a:t>How has safety concerns impacted air travel?</a:t>
             </a:r>
           </a:p>
         </p:txBody>
@@ -4819,8 +5697,8 @@
         </p:blipFill>
         <p:spPr bwMode="auto">
           <a:xfrm>
-            <a:off x="1901181" y="2036140"/>
-            <a:ext cx="8800686" cy="4331587"/>
+            <a:off x="1191684" y="1540042"/>
+            <a:ext cx="9808631" cy="4827685"/>
           </a:xfrm>
           <a:prstGeom prst="rect">
             <a:avLst/>
@@ -4885,43 +5763,15 @@
         </p:nvSpPr>
         <p:spPr/>
         <p:txBody>
-          <a:bodyPr/>
-          <a:lstStyle/>
-          <a:p>
-            <a:r>
-              <a:rPr lang="en-US" dirty="0"/>
-              <a:t>With fear of travel comes fear of bankruptcy.</a:t>
-            </a:r>
-          </a:p>
-        </p:txBody>
-      </p:sp>
-      <p:sp>
-        <p:nvSpPr>
-          <p:cNvPr id="3" name="Content Placeholder 2">
-            <a:extLst>
-              <a:ext uri="{FF2B5EF4-FFF2-40B4-BE49-F238E27FC236}">
-                <a16:creationId xmlns:a16="http://schemas.microsoft.com/office/drawing/2014/main" id="{807EC5D9-A172-48F6-A613-C966AC369E8C}"/>
-              </a:ext>
-            </a:extLst>
-          </p:cNvPr>
-          <p:cNvSpPr>
-            <a:spLocks noGrp="1"/>
-          </p:cNvSpPr>
-          <p:nvPr>
-            <p:ph idx="1"/>
-          </p:nvPr>
-        </p:nvSpPr>
-        <p:spPr>
-          <a:xfrm>
-            <a:off x="838200" y="1849344"/>
-            <a:ext cx="3563471" cy="4351338"/>
-          </a:xfrm>
-        </p:spPr>
-        <p:txBody>
-          <a:bodyPr/>
-          <a:lstStyle/>
-          <a:p>
-            <a:endParaRPr lang="en-US" dirty="0"/>
+          <a:bodyPr>
+            <a:normAutofit/>
+          </a:bodyPr>
+          <a:lstStyle/>
+          <a:p>
+            <a:r>
+              <a:rPr lang="en-US" sz="3600" dirty="0"/>
+              <a:t>With fear of travel comes our fear of bankruptcy.</a:t>
+            </a:r>
           </a:p>
         </p:txBody>
       </p:sp>
@@ -4954,8 +5804,8 @@
         </p:blipFill>
         <p:spPr bwMode="auto">
           <a:xfrm>
-            <a:off x="4810686" y="1825625"/>
-            <a:ext cx="6543114" cy="4372268"/>
+            <a:off x="2083528" y="1496183"/>
+            <a:ext cx="7477566" cy="4996692"/>
           </a:xfrm>
           <a:prstGeom prst="rect">
             <a:avLst/>
@@ -5002,64 +5852,6 @@
           <a:chExt cx="0" cy="0"/>
         </a:xfrm>
       </p:grpSpPr>
-      <p:sp>
-        <p:nvSpPr>
-          <p:cNvPr id="2" name="Title 1">
-            <a:extLst>
-              <a:ext uri="{FF2B5EF4-FFF2-40B4-BE49-F238E27FC236}">
-                <a16:creationId xmlns:a16="http://schemas.microsoft.com/office/drawing/2014/main" id="{1C683BD8-EB96-455C-9921-67577C98D85F}"/>
-              </a:ext>
-            </a:extLst>
-          </p:cNvPr>
-          <p:cNvSpPr>
-            <a:spLocks noGrp="1"/>
-          </p:cNvSpPr>
-          <p:nvPr>
-            <p:ph type="title"/>
-          </p:nvPr>
-        </p:nvSpPr>
-        <p:spPr/>
-        <p:txBody>
-          <a:bodyPr/>
-          <a:lstStyle/>
-          <a:p>
-            <a:r>
-              <a:rPr lang="en-US" dirty="0"/>
-              <a:t>A new Data Science Team was assembled to assess the problem and identify a solution.</a:t>
-            </a:r>
-          </a:p>
-        </p:txBody>
-      </p:sp>
-      <p:sp>
-        <p:nvSpPr>
-          <p:cNvPr id="3" name="Content Placeholder 2">
-            <a:extLst>
-              <a:ext uri="{FF2B5EF4-FFF2-40B4-BE49-F238E27FC236}">
-                <a16:creationId xmlns:a16="http://schemas.microsoft.com/office/drawing/2014/main" id="{A33EA4F6-4BAC-4696-8BD4-178F87CDAEFE}"/>
-              </a:ext>
-            </a:extLst>
-          </p:cNvPr>
-          <p:cNvSpPr>
-            <a:spLocks noGrp="1"/>
-          </p:cNvSpPr>
-          <p:nvPr>
-            <p:ph idx="1"/>
-          </p:nvPr>
-        </p:nvSpPr>
-        <p:spPr>
-          <a:xfrm>
-            <a:off x="7328646" y="1825625"/>
-            <a:ext cx="4025153" cy="4351338"/>
-          </a:xfrm>
-        </p:spPr>
-        <p:txBody>
-          <a:bodyPr/>
-          <a:lstStyle/>
-          <a:p>
-            <a:endParaRPr lang="en-US" dirty="0"/>
-          </a:p>
-        </p:txBody>
-      </p:sp>
       <p:pic>
         <p:nvPicPr>
           <p:cNvPr id="5" name="Picture 4">
@@ -5082,14 +5874,42 @@
         </p:blipFill>
         <p:spPr>
           <a:xfrm>
-            <a:off x="1348677" y="1690688"/>
-            <a:ext cx="5482428" cy="4887947"/>
+            <a:off x="2808509" y="1085771"/>
+            <a:ext cx="6319449" cy="5634206"/>
           </a:xfrm>
           <a:prstGeom prst="rect">
             <a:avLst/>
           </a:prstGeom>
         </p:spPr>
       </p:pic>
+      <p:sp>
+        <p:nvSpPr>
+          <p:cNvPr id="2" name="Title 1">
+            <a:extLst>
+              <a:ext uri="{FF2B5EF4-FFF2-40B4-BE49-F238E27FC236}">
+                <a16:creationId xmlns:a16="http://schemas.microsoft.com/office/drawing/2014/main" id="{1C683BD8-EB96-455C-9921-67577C98D85F}"/>
+              </a:ext>
+            </a:extLst>
+          </p:cNvPr>
+          <p:cNvSpPr>
+            <a:spLocks noGrp="1"/>
+          </p:cNvSpPr>
+          <p:nvPr>
+            <p:ph type="title"/>
+          </p:nvPr>
+        </p:nvSpPr>
+        <p:spPr/>
+        <p:txBody>
+          <a:bodyPr/>
+          <a:lstStyle/>
+          <a:p>
+            <a:r>
+              <a:rPr lang="en-US" dirty="0"/>
+              <a:t>A new Data Science team was assembled to assess the problem and identify a solution.</a:t>
+            </a:r>
+          </a:p>
+        </p:txBody>
+      </p:sp>
     </p:spTree>
     <p:extLst>
       <p:ext uri="{BB962C8B-B14F-4D97-AF65-F5344CB8AC3E}">
@@ -5120,64 +5940,6 @@
           <a:chExt cx="0" cy="0"/>
         </a:xfrm>
       </p:grpSpPr>
-      <p:sp>
-        <p:nvSpPr>
-          <p:cNvPr id="2" name="Title 1">
-            <a:extLst>
-              <a:ext uri="{FF2B5EF4-FFF2-40B4-BE49-F238E27FC236}">
-                <a16:creationId xmlns:a16="http://schemas.microsoft.com/office/drawing/2014/main" id="{C6CA5F74-D5F0-47D2-AB5C-92D6314EB611}"/>
-              </a:ext>
-            </a:extLst>
-          </p:cNvPr>
-          <p:cNvSpPr>
-            <a:spLocks noGrp="1"/>
-          </p:cNvSpPr>
-          <p:nvPr>
-            <p:ph type="title"/>
-          </p:nvPr>
-        </p:nvSpPr>
-        <p:spPr/>
-        <p:txBody>
-          <a:bodyPr/>
-          <a:lstStyle/>
-          <a:p>
-            <a:r>
-              <a:rPr lang="en-US" dirty="0"/>
-              <a:t>How many crashes has each aircraft been involved in?</a:t>
-            </a:r>
-          </a:p>
-        </p:txBody>
-      </p:sp>
-      <p:sp>
-        <p:nvSpPr>
-          <p:cNvPr id="3" name="Content Placeholder 2">
-            <a:extLst>
-              <a:ext uri="{FF2B5EF4-FFF2-40B4-BE49-F238E27FC236}">
-                <a16:creationId xmlns:a16="http://schemas.microsoft.com/office/drawing/2014/main" id="{26805E1B-A94C-42BC-9093-E84E260BA00A}"/>
-              </a:ext>
-            </a:extLst>
-          </p:cNvPr>
-          <p:cNvSpPr>
-            <a:spLocks noGrp="1"/>
-          </p:cNvSpPr>
-          <p:nvPr>
-            <p:ph idx="1"/>
-          </p:nvPr>
-        </p:nvSpPr>
-        <p:spPr>
-          <a:xfrm>
-            <a:off x="838199" y="1892860"/>
-            <a:ext cx="3209365" cy="4351338"/>
-          </a:xfrm>
-        </p:spPr>
-        <p:txBody>
-          <a:bodyPr/>
-          <a:lstStyle/>
-          <a:p>
-            <a:endParaRPr lang="en-US" dirty="0"/>
-          </a:p>
-        </p:txBody>
-      </p:sp>
       <p:pic>
         <p:nvPicPr>
           <p:cNvPr id="2050" name="Picture 2">
@@ -5207,8 +5969,8 @@
         </p:blipFill>
         <p:spPr bwMode="auto">
           <a:xfrm>
-            <a:off x="4047564" y="1234710"/>
-            <a:ext cx="7422192" cy="4885310"/>
+            <a:off x="3064042" y="1414244"/>
+            <a:ext cx="7715903" cy="5078631"/>
           </a:xfrm>
           <a:prstGeom prst="rect">
             <a:avLst/>
@@ -5225,6 +5987,34 @@
           </a:extLst>
         </p:spPr>
       </p:pic>
+      <p:sp>
+        <p:nvSpPr>
+          <p:cNvPr id="2" name="Title 1">
+            <a:extLst>
+              <a:ext uri="{FF2B5EF4-FFF2-40B4-BE49-F238E27FC236}">
+                <a16:creationId xmlns:a16="http://schemas.microsoft.com/office/drawing/2014/main" id="{C6CA5F74-D5F0-47D2-AB5C-92D6314EB611}"/>
+              </a:ext>
+            </a:extLst>
+          </p:cNvPr>
+          <p:cNvSpPr>
+            <a:spLocks noGrp="1"/>
+          </p:cNvSpPr>
+          <p:nvPr>
+            <p:ph type="title"/>
+          </p:nvPr>
+        </p:nvSpPr>
+        <p:spPr/>
+        <p:txBody>
+          <a:bodyPr/>
+          <a:lstStyle/>
+          <a:p>
+            <a:r>
+              <a:rPr lang="en-US" dirty="0"/>
+              <a:t>How many crashes has each aircraft been involved in?</a:t>
+            </a:r>
+          </a:p>
+        </p:txBody>
+      </p:sp>
     </p:spTree>
     <p:extLst>
       <p:ext uri="{BB962C8B-B14F-4D97-AF65-F5344CB8AC3E}">
@@ -5312,7 +6102,7 @@
         </p:blipFill>
         <p:spPr bwMode="auto">
           <a:xfrm>
-            <a:off x="1152015" y="1984486"/>
+            <a:off x="1200141" y="1968444"/>
             <a:ext cx="10354830" cy="4671808"/>
           </a:xfrm>
           <a:prstGeom prst="rect">
@@ -5410,44 +6200,14 @@
         </p:blipFill>
         <p:spPr>
           <a:xfrm>
-            <a:off x="623484" y="2056274"/>
-            <a:ext cx="8296399" cy="3900209"/>
+            <a:off x="950495" y="1530267"/>
+            <a:ext cx="10824411" cy="5088649"/>
           </a:xfrm>
           <a:prstGeom prst="rect">
             <a:avLst/>
           </a:prstGeom>
         </p:spPr>
       </p:pic>
-      <p:sp>
-        <p:nvSpPr>
-          <p:cNvPr id="8" name="Content Placeholder 2">
-            <a:extLst>
-              <a:ext uri="{FF2B5EF4-FFF2-40B4-BE49-F238E27FC236}">
-                <a16:creationId xmlns:a16="http://schemas.microsoft.com/office/drawing/2014/main" id="{354383C8-02F5-4011-855A-958AD4B87EEF}"/>
-              </a:ext>
-            </a:extLst>
-          </p:cNvPr>
-          <p:cNvSpPr>
-            <a:spLocks noGrp="1"/>
-          </p:cNvSpPr>
-          <p:nvPr>
-            <p:ph idx="1"/>
-          </p:nvPr>
-        </p:nvSpPr>
-        <p:spPr>
-          <a:xfrm>
-            <a:off x="8812306" y="2056274"/>
-            <a:ext cx="3003176" cy="4321269"/>
-          </a:xfrm>
-        </p:spPr>
-        <p:txBody>
-          <a:bodyPr/>
-          <a:lstStyle/>
-          <a:p>
-            <a:endParaRPr lang="en-US" dirty="0"/>
-          </a:p>
-        </p:txBody>
-      </p:sp>
     </p:spTree>
     <p:extLst>
       <p:ext uri="{BB962C8B-B14F-4D97-AF65-F5344CB8AC3E}">

</xml_diff>